<commit_message>
removed last slide and comments
git-svn-id: file:///localdisk/subversion/inca/trunk/pubs@12551 7dba3f4a-8be6-0310-8b3b-b4fec25ea7f3
</commit_message>
<xml_diff>
--- a/pubs/talks/2009/inca-fg-ahm-1009.pptx
+++ b/pubs/talks/2009/inca-fg-ahm-1009.pptx
@@ -5,7 +5,7 @@
     <p:sldMasterId id="2147483648" r:id="rId1"/>
   </p:sldMasterIdLst>
   <p:notesMasterIdLst>
-    <p:notesMasterId r:id="rId11"/>
+    <p:notesMasterId r:id="rId10"/>
   </p:notesMasterIdLst>
   <p:sldIdLst>
     <p:sldId id="256" r:id="rId2"/>
@@ -16,7 +16,6 @@
     <p:sldId id="270" r:id="rId7"/>
     <p:sldId id="271" r:id="rId8"/>
     <p:sldId id="267" r:id="rId9"/>
-    <p:sldId id="272" r:id="rId10"/>
   </p:sldIdLst>
   <p:sldSz cx="9144000" cy="6858000" type="screen4x3"/>
   <p:notesSz cx="6858000" cy="9144000"/>
@@ -516,76 +515,6 @@
             <a:pPr marL="228600" indent="-228600">
               <a:buAutoNum type="arabicPeriod"/>
             </a:pPr>
-            <a:r>
-              <a:rPr lang="en-US" dirty="0" smtClean="0"/>
-              <a:t>What is </a:t>
-            </a:r>
-            <a:r>
-              <a:rPr lang="en-US" dirty="0" err="1" smtClean="0"/>
-              <a:t>inca</a:t>
-            </a:r>
-            <a:r>
-              <a:rPr lang="en-US" dirty="0" smtClean="0"/>
-              <a:t> and what does it look like – reporters</a:t>
-            </a:r>
-            <a:r>
-              <a:rPr lang="en-US" baseline="0" dirty="0" smtClean="0"/>
-              <a:t> and data consumers</a:t>
-            </a:r>
-            <a:endParaRPr lang="en-US" dirty="0" smtClean="0"/>
-          </a:p>
-          <a:p>
-            <a:pPr marL="228600" indent="-228600">
-              <a:buAutoNum type="arabicPeriod"/>
-            </a:pPr>
-            <a:r>
-              <a:rPr lang="en-US" dirty="0" smtClean="0"/>
-              <a:t>Software status</a:t>
-            </a:r>
-          </a:p>
-          <a:p>
-            <a:pPr marL="228600" indent="-228600">
-              <a:buAutoNum type="arabicPeriod"/>
-            </a:pPr>
-            <a:r>
-              <a:rPr lang="en-US" dirty="0" smtClean="0"/>
-              <a:t>Should</a:t>
-            </a:r>
-            <a:r>
-              <a:rPr lang="en-US" baseline="0" dirty="0" smtClean="0"/>
-              <a:t> be able to leverage a lot from our TG install – info svc</a:t>
-            </a:r>
-          </a:p>
-          <a:p>
-            <a:pPr marL="228600" indent="-228600">
-              <a:buAutoNum type="arabicPeriod"/>
-            </a:pPr>
-            <a:r>
-              <a:rPr lang="en-US" baseline="0" dirty="0" smtClean="0"/>
-              <a:t>Performance experiments with </a:t>
-            </a:r>
-            <a:r>
-              <a:rPr lang="en-US" baseline="0" dirty="0" err="1" smtClean="0"/>
-              <a:t>GrASP</a:t>
-            </a:r>
-            <a:r>
-              <a:rPr lang="en-US" baseline="0" dirty="0" smtClean="0"/>
-              <a:t> and IPM</a:t>
-            </a:r>
-          </a:p>
-          <a:p>
-            <a:pPr marL="228600" indent="-228600">
-              <a:buAutoNum type="arabicPeriod"/>
-            </a:pPr>
-            <a:r>
-              <a:rPr lang="en-US" baseline="0" dirty="0" smtClean="0"/>
-              <a:t>Will need to modify Inca to monitor VM environments</a:t>
-            </a:r>
-          </a:p>
-          <a:p>
-            <a:pPr marL="228600" indent="-228600">
-              <a:buAutoNum type="arabicPeriod"/>
-            </a:pPr>
             <a:endParaRPr lang="en-US" dirty="0"/>
           </a:p>
         </p:txBody>
@@ -722,756 +651,6 @@
           <a:bodyPr/>
           <a:lstStyle/>
           <a:p>
-            <a:pPr marL="0" marR="0" indent="0" algn="l" defTabSz="457200" rtl="0" eaLnBrk="1" fontAlgn="auto" latinLnBrk="0" hangingPunct="1">
-              <a:lnSpc>
-                <a:spcPct val="100000"/>
-              </a:lnSpc>
-              <a:spcBef>
-                <a:spcPts val="0"/>
-              </a:spcBef>
-              <a:spcAft>
-                <a:spcPts val="0"/>
-              </a:spcAft>
-              <a:buClrTx/>
-              <a:buSzTx/>
-              <a:buFontTx/>
-              <a:buNone/>
-              <a:tabLst/>
-              <a:defRPr/>
-            </a:pPr>
-            <a:r>
-              <a:rPr lang="en-US" dirty="0" smtClean="0">
-                <a:latin typeface="Arial" pitchFamily="-65" charset="0"/>
-                <a:ea typeface="ＭＳ Ｐゴシック" pitchFamily="-65" charset="-128"/>
-                <a:cs typeface="ＭＳ Ｐゴシック" pitchFamily="-65" charset="-128"/>
-              </a:rPr>
-              <a:t>The approach we’ve developed over the years to address this is an active monitoring approach that we call user-level monitoring and the idea is that to attempt to emulate a user of the Grid and test the various services and software.   The goal being to </a:t>
-            </a:r>
-            <a:r>
-              <a:rPr lang="en-US" sz="1100" dirty="0" smtClean="0">
-                <a:latin typeface="Arial" pitchFamily="-65" charset="0"/>
-                <a:ea typeface="ＭＳ Ｐゴシック" pitchFamily="-65" charset="-128"/>
-                <a:cs typeface="ＭＳ Ｐゴシック" pitchFamily="-65" charset="-128"/>
-              </a:rPr>
-              <a:t>detect Grid infrastructure problems before the user’s notice them.</a:t>
-            </a:r>
-            <a:r>
-              <a:rPr lang="en-US" dirty="0" smtClean="0">
-                <a:latin typeface="Arial" pitchFamily="-65" charset="0"/>
-                <a:ea typeface="ＭＳ Ｐゴシック" pitchFamily="-65" charset="-128"/>
-                <a:cs typeface="ＭＳ Ｐゴシック" pitchFamily="-65" charset="-128"/>
-              </a:rPr>
-              <a:t> In order to provide user-level monitoring a system would need to…</a:t>
-            </a:r>
-          </a:p>
-          <a:p>
-            <a:pPr marL="0" marR="0" indent="0" algn="l" defTabSz="457200" rtl="0" eaLnBrk="1" fontAlgn="auto" latinLnBrk="0" hangingPunct="1">
-              <a:lnSpc>
-                <a:spcPct val="100000"/>
-              </a:lnSpc>
-              <a:spcBef>
-                <a:spcPts val="0"/>
-              </a:spcBef>
-              <a:spcAft>
-                <a:spcPts val="0"/>
-              </a:spcAft>
-              <a:buClrTx/>
-              <a:buSzTx/>
-              <a:buFontTx/>
-              <a:buNone/>
-              <a:tabLst/>
-              <a:defRPr/>
-            </a:pPr>
-            <a:endParaRPr lang="en-US" dirty="0" smtClean="0">
-              <a:latin typeface="Arial" pitchFamily="-65" charset="0"/>
-              <a:ea typeface="ＭＳ Ｐゴシック" pitchFamily="-65" charset="-128"/>
-            </a:endParaRPr>
-          </a:p>
-          <a:p>
-            <a:pPr marL="0" marR="0" indent="0" algn="l" defTabSz="457200" rtl="0" eaLnBrk="1" fontAlgn="auto" latinLnBrk="0" hangingPunct="1">
-              <a:lnSpc>
-                <a:spcPct val="100000"/>
-              </a:lnSpc>
-              <a:spcBef>
-                <a:spcPts val="0"/>
-              </a:spcBef>
-              <a:spcAft>
-                <a:spcPts val="0"/>
-              </a:spcAft>
-              <a:buClrTx/>
-              <a:buSzTx/>
-              <a:buFontTx/>
-              <a:buNone/>
-              <a:tabLst/>
-              <a:defRPr/>
-            </a:pPr>
-            <a:r>
-              <a:rPr lang="en-US" dirty="0" smtClean="0">
-                <a:latin typeface="Arial" pitchFamily="-65" charset="0"/>
-                <a:ea typeface="ＭＳ Ｐゴシック" pitchFamily="-65" charset="-128"/>
-              </a:rPr>
-              <a:t>Enables consistent user-level testing across resources</a:t>
-            </a:r>
-          </a:p>
-          <a:p>
-            <a:pPr marL="0" marR="0" indent="0" algn="l" defTabSz="457200" rtl="0" eaLnBrk="1" fontAlgn="auto" latinLnBrk="0" hangingPunct="1">
-              <a:lnSpc>
-                <a:spcPct val="100000"/>
-              </a:lnSpc>
-              <a:spcBef>
-                <a:spcPts val="0"/>
-              </a:spcBef>
-              <a:spcAft>
-                <a:spcPts val="0"/>
-              </a:spcAft>
-              <a:buClrTx/>
-              <a:buSzTx/>
-              <a:buFont typeface="Arial"/>
-              <a:buChar char="•"/>
-              <a:tabLst/>
-              <a:defRPr/>
-            </a:pPr>
-            <a:r>
-              <a:rPr lang="en-US" dirty="0" smtClean="0"/>
-              <a:t>Runs from a standard user account and uses a standard GSI credential</a:t>
-            </a:r>
-          </a:p>
-          <a:p>
-            <a:pPr marL="457200" marR="0" lvl="1" indent="0" algn="l" defTabSz="457200" rtl="0" eaLnBrk="1" fontAlgn="auto" latinLnBrk="0" hangingPunct="1">
-              <a:lnSpc>
-                <a:spcPct val="100000"/>
-              </a:lnSpc>
-              <a:spcBef>
-                <a:spcPts val="0"/>
-              </a:spcBef>
-              <a:spcAft>
-                <a:spcPts val="0"/>
-              </a:spcAft>
-              <a:buClrTx/>
-              <a:buSzTx/>
-              <a:buFont typeface="Arial"/>
-              <a:buChar char="•"/>
-              <a:tabLst/>
-              <a:defRPr/>
-            </a:pPr>
-            <a:r>
-              <a:rPr lang="en-US" dirty="0" smtClean="0">
-                <a:latin typeface="Arial" pitchFamily="-65" charset="0"/>
-                <a:ea typeface="ＭＳ Ｐゴシック" pitchFamily="-65" charset="-128"/>
-                <a:cs typeface="ＭＳ Ｐゴシック" pitchFamily="-65" charset="-128"/>
-              </a:rPr>
-              <a:t>First testing should be done from a standard user account that’s no different than what a new user of a Grid receives.  Early on, we found that testing was done from sys admin accounts which oftentimes have special privileges and have custom shell initialization file.  So when users logged on to the system, things would not work for them due to permission problems, environment variables, etc.</a:t>
-            </a:r>
-          </a:p>
-          <a:p>
-            <a:pPr marL="457200" marR="0" lvl="1" indent="0" algn="l" defTabSz="457200" rtl="0" eaLnBrk="1" fontAlgn="auto" latinLnBrk="0" hangingPunct="1">
-              <a:lnSpc>
-                <a:spcPct val="100000"/>
-              </a:lnSpc>
-              <a:spcBef>
-                <a:spcPts val="0"/>
-              </a:spcBef>
-              <a:spcAft>
-                <a:spcPts val="0"/>
-              </a:spcAft>
-              <a:buClrTx/>
-              <a:buSzTx/>
-              <a:buFont typeface="Arial"/>
-              <a:buChar char="•"/>
-              <a:tabLst/>
-              <a:defRPr/>
-            </a:pPr>
-            <a:r>
-              <a:rPr lang="en-US" dirty="0" smtClean="0">
-                <a:latin typeface="Arial" pitchFamily="-65" charset="0"/>
-                <a:ea typeface="ＭＳ Ｐゴシック" pitchFamily="-65" charset="-128"/>
-                <a:cs typeface="ＭＳ Ｐゴシック" pitchFamily="-65" charset="-128"/>
-              </a:rPr>
-              <a:t>Second, because many Grid services require a valid GSI credential, testing needed be run with a standard GSI credential that was mapped on resources to our standard user account</a:t>
-            </a:r>
-          </a:p>
-          <a:p>
-            <a:pPr marL="0" marR="0" indent="0" algn="l" defTabSz="457200" rtl="0" eaLnBrk="1" fontAlgn="auto" latinLnBrk="0" hangingPunct="1">
-              <a:lnSpc>
-                <a:spcPct val="100000"/>
-              </a:lnSpc>
-              <a:spcBef>
-                <a:spcPts val="0"/>
-              </a:spcBef>
-              <a:spcAft>
-                <a:spcPts val="0"/>
-              </a:spcAft>
-              <a:buClrTx/>
-              <a:buSzTx/>
-              <a:buFont typeface="Arial"/>
-              <a:buChar char="•"/>
-              <a:tabLst/>
-              <a:defRPr/>
-            </a:pPr>
-            <a:r>
-              <a:rPr lang="en-US" dirty="0" smtClean="0"/>
-              <a:t>Verifies user-accessible Grid access points</a:t>
-            </a:r>
-          </a:p>
-          <a:p>
-            <a:pPr marL="457200" marR="0" lvl="1" indent="0" algn="l" defTabSz="457200" rtl="0" eaLnBrk="1" fontAlgn="auto" latinLnBrk="0" hangingPunct="1">
-              <a:lnSpc>
-                <a:spcPct val="100000"/>
-              </a:lnSpc>
-              <a:spcBef>
-                <a:spcPts val="0"/>
-              </a:spcBef>
-              <a:spcAft>
-                <a:spcPts val="0"/>
-              </a:spcAft>
-              <a:buClrTx/>
-              <a:buSzTx/>
-              <a:buFont typeface="Arial"/>
-              <a:buChar char="•"/>
-              <a:tabLst/>
-              <a:defRPr/>
-            </a:pPr>
-            <a:r>
-              <a:rPr lang="en-US" dirty="0" smtClean="0">
-                <a:latin typeface="Arial" pitchFamily="-65" charset="0"/>
-                <a:ea typeface="ＭＳ Ｐゴシック" pitchFamily="-65" charset="-128"/>
-                <a:cs typeface="ＭＳ Ｐゴシック" pitchFamily="-65" charset="-128"/>
-              </a:rPr>
-              <a:t>In </a:t>
-            </a:r>
-            <a:r>
-              <a:rPr lang="en-US" dirty="0" err="1" smtClean="0">
-                <a:latin typeface="Arial" pitchFamily="-65" charset="0"/>
-                <a:ea typeface="ＭＳ Ｐゴシック" pitchFamily="-65" charset="-128"/>
-                <a:cs typeface="ＭＳ Ｐゴシック" pitchFamily="-65" charset="-128"/>
-              </a:rPr>
-              <a:t>TeraGrid</a:t>
-            </a:r>
-            <a:r>
-              <a:rPr lang="en-US" dirty="0" smtClean="0">
-                <a:latin typeface="Arial" pitchFamily="-65" charset="0"/>
-                <a:ea typeface="ＭＳ Ｐゴシック" pitchFamily="-65" charset="-128"/>
-                <a:cs typeface="ＭＳ Ｐゴシック" pitchFamily="-65" charset="-128"/>
-              </a:rPr>
-              <a:t>, a user can log in from any of the sites so has been important for us to run locally on each resource and verify that CTSS is available, there and working, etc.   </a:t>
-            </a:r>
-          </a:p>
-          <a:p>
-            <a:pPr marL="0" marR="0" lvl="0" indent="0" algn="l" defTabSz="457200" rtl="0" eaLnBrk="1" fontAlgn="auto" latinLnBrk="0" hangingPunct="1">
-              <a:lnSpc>
-                <a:spcPct val="100000"/>
-              </a:lnSpc>
-              <a:spcBef>
-                <a:spcPts val="0"/>
-              </a:spcBef>
-              <a:spcAft>
-                <a:spcPts val="0"/>
-              </a:spcAft>
-              <a:buClrTx/>
-              <a:buSzTx/>
-              <a:buFont typeface="Arial"/>
-              <a:buChar char="•"/>
-              <a:tabLst/>
-              <a:defRPr/>
-            </a:pPr>
-            <a:r>
-              <a:rPr lang="en-US" dirty="0" smtClean="0"/>
-              <a:t>Centrally manages monitoring configuration </a:t>
-            </a:r>
-            <a:endParaRPr lang="en-US" dirty="0" smtClean="0">
-              <a:latin typeface="Arial" pitchFamily="-65" charset="0"/>
-              <a:ea typeface="ＭＳ Ｐゴシック" pitchFamily="-65" charset="-128"/>
-              <a:cs typeface="ＭＳ Ｐゴシック" pitchFamily="-65" charset="-128"/>
-            </a:endParaRPr>
-          </a:p>
-          <a:p>
-            <a:pPr marL="457200" marR="0" lvl="1" indent="0" algn="l" defTabSz="457200" rtl="0" eaLnBrk="1" fontAlgn="auto" latinLnBrk="0" hangingPunct="1">
-              <a:lnSpc>
-                <a:spcPct val="100000"/>
-              </a:lnSpc>
-              <a:spcBef>
-                <a:spcPts val="0"/>
-              </a:spcBef>
-              <a:spcAft>
-                <a:spcPts val="0"/>
-              </a:spcAft>
-              <a:buClrTx/>
-              <a:buSzTx/>
-              <a:buFont typeface="Arial"/>
-              <a:buChar char="•"/>
-              <a:tabLst/>
-              <a:defRPr/>
-            </a:pPr>
-            <a:r>
-              <a:rPr lang="en-US" dirty="0" smtClean="0">
-                <a:latin typeface="Arial" pitchFamily="-65" charset="0"/>
-                <a:ea typeface="ＭＳ Ｐゴシック" pitchFamily="-65" charset="-128"/>
-                <a:cs typeface="ＭＳ Ｐゴシック" pitchFamily="-65" charset="-128"/>
-              </a:rPr>
-              <a:t>Fourth, is that rather than allowing each sites to configure tests for their resources, the configuration of tests is done centrally and the goal of that is to ensure that resources are being tested consistently across </a:t>
-            </a:r>
-            <a:r>
-              <a:rPr lang="en-US" dirty="0" err="1" smtClean="0">
-                <a:latin typeface="Arial" pitchFamily="-65" charset="0"/>
-                <a:ea typeface="ＭＳ Ｐゴシック" pitchFamily="-65" charset="-128"/>
-                <a:cs typeface="ＭＳ Ｐゴシック" pitchFamily="-65" charset="-128"/>
-              </a:rPr>
-              <a:t>TeraGrid</a:t>
-            </a:r>
-            <a:r>
-              <a:rPr lang="en-US" dirty="0" smtClean="0">
-                <a:latin typeface="Arial" pitchFamily="-65" charset="0"/>
-                <a:ea typeface="ＭＳ Ｐゴシック" pitchFamily="-65" charset="-128"/>
-                <a:cs typeface="ＭＳ Ｐゴシック" pitchFamily="-65" charset="-128"/>
-              </a:rPr>
-              <a:t>.  So, for example sometimes if a site has installed an incompatible version of software, this type of monitoring will detect that.  And this is the same model as a user executing a Grid application…they will have a configuration file for their application.</a:t>
-            </a:r>
-          </a:p>
-          <a:p>
-            <a:pPr marL="0" marR="0" lvl="0" indent="0" algn="l" defTabSz="457200" rtl="0" eaLnBrk="1" fontAlgn="auto" latinLnBrk="0" hangingPunct="1">
-              <a:lnSpc>
-                <a:spcPct val="100000"/>
-              </a:lnSpc>
-              <a:spcBef>
-                <a:spcPts val="0"/>
-              </a:spcBef>
-              <a:spcAft>
-                <a:spcPts val="0"/>
-              </a:spcAft>
-              <a:buClrTx/>
-              <a:buSzTx/>
-              <a:buFont typeface="Arial"/>
-              <a:buChar char="•"/>
-              <a:tabLst/>
-              <a:defRPr/>
-            </a:pPr>
-            <a:endParaRPr lang="en-US" dirty="0" smtClean="0">
-              <a:latin typeface="Arial" pitchFamily="-65" charset="0"/>
-              <a:ea typeface="ＭＳ Ｐゴシック" pitchFamily="-65" charset="-128"/>
-              <a:cs typeface="ＭＳ Ｐゴシック" pitchFamily="-65" charset="-128"/>
-            </a:endParaRPr>
-          </a:p>
-          <a:p>
-            <a:pPr marL="457200" marR="0" lvl="1" indent="0" algn="l" defTabSz="457200" rtl="0" eaLnBrk="1" fontAlgn="auto" latinLnBrk="0" hangingPunct="1">
-              <a:lnSpc>
-                <a:spcPct val="100000"/>
-              </a:lnSpc>
-              <a:spcBef>
-                <a:spcPts val="0"/>
-              </a:spcBef>
-              <a:spcAft>
-                <a:spcPts val="0"/>
-              </a:spcAft>
-              <a:buClrTx/>
-              <a:buSzTx/>
-              <a:buFont typeface="Arial"/>
-              <a:buChar char="•"/>
-              <a:tabLst/>
-              <a:defRPr/>
-            </a:pPr>
-            <a:endParaRPr lang="en-US" dirty="0" smtClean="0">
-              <a:latin typeface="Arial" pitchFamily="-65" charset="0"/>
-              <a:ea typeface="ＭＳ Ｐゴシック" pitchFamily="-65" charset="-128"/>
-              <a:cs typeface="ＭＳ Ｐゴシック" pitchFamily="-65" charset="-128"/>
-            </a:endParaRPr>
-          </a:p>
-          <a:p>
-            <a:pPr marL="0" marR="0" lvl="0" indent="0" algn="l" defTabSz="457200" rtl="0" eaLnBrk="1" fontAlgn="auto" latinLnBrk="0" hangingPunct="1">
-              <a:lnSpc>
-                <a:spcPct val="100000"/>
-              </a:lnSpc>
-              <a:spcBef>
-                <a:spcPts val="0"/>
-              </a:spcBef>
-              <a:spcAft>
-                <a:spcPts val="0"/>
-              </a:spcAft>
-              <a:buClrTx/>
-              <a:buSzTx/>
-              <a:buFont typeface="Arial"/>
-              <a:buNone/>
-              <a:tabLst/>
-              <a:defRPr/>
-            </a:pPr>
-            <a:r>
-              <a:rPr lang="en-US" dirty="0" smtClean="0">
-                <a:latin typeface="Arial" pitchFamily="-65" charset="0"/>
-                <a:ea typeface="ＭＳ Ｐゴシック" pitchFamily="-65" charset="-128"/>
-              </a:rPr>
-              <a:t>Easy to configure and maintain</a:t>
-            </a:r>
-          </a:p>
-          <a:p>
-            <a:pPr marL="0" marR="0" lvl="0" indent="0" algn="l" defTabSz="457200" rtl="0" eaLnBrk="1" fontAlgn="auto" latinLnBrk="0" hangingPunct="1">
-              <a:lnSpc>
-                <a:spcPct val="100000"/>
-              </a:lnSpc>
-              <a:spcBef>
-                <a:spcPts val="0"/>
-              </a:spcBef>
-              <a:spcAft>
-                <a:spcPts val="0"/>
-              </a:spcAft>
-              <a:buClrTx/>
-              <a:buSzTx/>
-              <a:buFont typeface="Arial"/>
-              <a:buNone/>
-              <a:tabLst/>
-              <a:defRPr/>
-            </a:pPr>
-            <a:r>
-              <a:rPr lang="en-US" dirty="0" smtClean="0"/>
-              <a:t>- Automates periodic execution of tests</a:t>
-            </a:r>
-          </a:p>
-          <a:p>
-            <a:pPr marL="0" marR="0" lvl="0" indent="0" algn="l" defTabSz="457200" rtl="0" eaLnBrk="1" fontAlgn="auto" latinLnBrk="0" hangingPunct="1">
-              <a:lnSpc>
-                <a:spcPct val="100000"/>
-              </a:lnSpc>
-              <a:spcBef>
-                <a:spcPts val="0"/>
-              </a:spcBef>
-              <a:spcAft>
-                <a:spcPts val="0"/>
-              </a:spcAft>
-              <a:buClrTx/>
-              <a:buSzTx/>
-              <a:buFont typeface="Arial"/>
-              <a:buNone/>
-              <a:tabLst/>
-              <a:defRPr/>
-            </a:pPr>
-            <a:r>
-              <a:rPr lang="en-US" dirty="0" smtClean="0">
-                <a:latin typeface="Arial" pitchFamily="-65" charset="0"/>
-                <a:ea typeface="ＭＳ Ｐゴシック" pitchFamily="-65" charset="-128"/>
-              </a:rPr>
-              <a:t>-</a:t>
-            </a:r>
-            <a:r>
-              <a:rPr lang="en-US" b="1" dirty="0" smtClean="0">
-                <a:latin typeface="Arial" pitchFamily="-65" charset="0"/>
-                <a:ea typeface="ＭＳ Ｐゴシック" pitchFamily="-65" charset="-128"/>
-                <a:cs typeface="ＭＳ Ｐゴシック" pitchFamily="-65" charset="-128"/>
-              </a:rPr>
-              <a:t>Manages and collects a large number of results through a GUI interface (</a:t>
-            </a:r>
-            <a:r>
-              <a:rPr lang="en-US" b="1" dirty="0" err="1" smtClean="0">
-                <a:latin typeface="Arial" pitchFamily="-65" charset="0"/>
-                <a:ea typeface="ＭＳ Ｐゴシック" pitchFamily="-65" charset="-128"/>
-                <a:cs typeface="ＭＳ Ｐゴシック" pitchFamily="-65" charset="-128"/>
-              </a:rPr>
-              <a:t>incat</a:t>
-            </a:r>
-            <a:r>
-              <a:rPr lang="en-US" b="1" dirty="0" smtClean="0">
-                <a:latin typeface="Arial" pitchFamily="-65" charset="0"/>
-                <a:ea typeface="ＭＳ Ｐゴシック" pitchFamily="-65" charset="-128"/>
-                <a:cs typeface="ＭＳ Ｐゴシック" pitchFamily="-65" charset="-128"/>
-              </a:rPr>
-              <a:t>)</a:t>
-            </a:r>
-            <a:endParaRPr lang="en-US" dirty="0" smtClean="0">
-              <a:latin typeface="Arial" pitchFamily="-65" charset="0"/>
-              <a:ea typeface="ＭＳ Ｐゴシック" pitchFamily="-65" charset="-128"/>
-            </a:endParaRPr>
-          </a:p>
-          <a:p>
-            <a:pPr marL="0" marR="0" lvl="0" indent="0" algn="l" defTabSz="457200" rtl="0" eaLnBrk="1" fontAlgn="auto" latinLnBrk="0" hangingPunct="1">
-              <a:lnSpc>
-                <a:spcPct val="100000"/>
-              </a:lnSpc>
-              <a:spcBef>
-                <a:spcPts val="0"/>
-              </a:spcBef>
-              <a:spcAft>
-                <a:spcPts val="0"/>
-              </a:spcAft>
-              <a:buClrTx/>
-              <a:buSzTx/>
-              <a:buFont typeface="Arial"/>
-              <a:buChar char="•"/>
-              <a:tabLst/>
-              <a:defRPr/>
-            </a:pPr>
-            <a:endParaRPr lang="en-US" dirty="0" smtClean="0">
-              <a:latin typeface="Arial" pitchFamily="-65" charset="0"/>
-              <a:ea typeface="ＭＳ Ｐゴシック" pitchFamily="-65" charset="-128"/>
-              <a:cs typeface="ＭＳ Ｐゴシック" pitchFamily="-65" charset="-128"/>
-            </a:endParaRPr>
-          </a:p>
-          <a:p>
-            <a:pPr marL="0" marR="0" lvl="0" indent="0" algn="l" defTabSz="457200" rtl="0" eaLnBrk="1" fontAlgn="auto" latinLnBrk="0" hangingPunct="1">
-              <a:lnSpc>
-                <a:spcPct val="100000"/>
-              </a:lnSpc>
-              <a:spcBef>
-                <a:spcPts val="0"/>
-              </a:spcBef>
-              <a:spcAft>
-                <a:spcPts val="0"/>
-              </a:spcAft>
-              <a:buClrTx/>
-              <a:buSzTx/>
-              <a:buFont typeface="Arial"/>
-              <a:buNone/>
-              <a:tabLst/>
-              <a:defRPr/>
-            </a:pPr>
-            <a:r>
-              <a:rPr lang="en-US" dirty="0" smtClean="0">
-                <a:latin typeface="Arial" pitchFamily="-65" charset="0"/>
-                <a:ea typeface="ＭＳ Ｐゴシック" pitchFamily="-65" charset="-128"/>
-              </a:rPr>
-              <a:t>Easy to collect a wide variety of data from resource</a:t>
-            </a:r>
-          </a:p>
-          <a:p>
-            <a:pPr>
-              <a:buFont typeface="Arial"/>
-              <a:buChar char="•"/>
-            </a:pPr>
-            <a:r>
-              <a:rPr lang="en-US" b="1" dirty="0" smtClean="0">
-                <a:latin typeface="Arial" pitchFamily="-65" charset="0"/>
-                <a:ea typeface="ＭＳ Ｐゴシック" pitchFamily="-65" charset="-128"/>
-                <a:cs typeface="ＭＳ Ｐゴシック" pitchFamily="-65" charset="-128"/>
-              </a:rPr>
-              <a:t>Data is collected by reporters, executables that measure some aspect of the system and output the result as XML. Multiple types of data can be collected. Perl APIs are provided to make it easy to write reporters; most are less than 30 lines of code.</a:t>
-            </a:r>
-          </a:p>
-          <a:p>
-            <a:pPr>
-              <a:buFont typeface="Arial"/>
-              <a:buChar char="•"/>
-            </a:pPr>
-            <a:r>
-              <a:rPr lang="en-US" b="1" dirty="0" smtClean="0">
-                <a:latin typeface="Arial" pitchFamily="-65" charset="0"/>
-                <a:ea typeface="ＭＳ Ｐゴシック" pitchFamily="-65" charset="-128"/>
-                <a:cs typeface="ＭＳ Ｐゴシック" pitchFamily="-65" charset="-128"/>
-              </a:rPr>
-              <a:t>Large variety of tests: Inca offers a number of prewritten test scripts, </a:t>
-            </a:r>
-            <a:r>
-              <a:rPr lang="en-US" b="1" dirty="0" err="1" smtClean="0">
-                <a:latin typeface="Arial" pitchFamily="-65" charset="0"/>
-                <a:ea typeface="ＭＳ Ｐゴシック" pitchFamily="-65" charset="-128"/>
-                <a:cs typeface="ＭＳ Ｐゴシック" pitchFamily="-65" charset="-128"/>
-              </a:rPr>
-              <a:t>called</a:t>
-            </a:r>
-            <a:r>
-              <a:rPr lang="en-US" b="1" u="sng" dirty="0" err="1" smtClean="0">
-                <a:latin typeface="Arial" pitchFamily="-65" charset="0"/>
-                <a:ea typeface="ＭＳ Ｐゴシック" pitchFamily="-65" charset="-128"/>
-                <a:cs typeface="ＭＳ Ｐゴシック" pitchFamily="-65" charset="-128"/>
-              </a:rPr>
-              <a:t>reporters</a:t>
-            </a:r>
-            <a:r>
-              <a:rPr lang="en-US" b="1" u="sng" dirty="0" smtClean="0">
-                <a:latin typeface="Arial" pitchFamily="-65" charset="0"/>
-                <a:ea typeface="ＭＳ Ｐゴシック" pitchFamily="-65" charset="-128"/>
-                <a:cs typeface="ＭＳ Ｐゴシック" pitchFamily="-65" charset="-128"/>
-              </a:rPr>
-              <a:t>, for monitoring Grid health. Reporter APIs make it easy to create new Inca tests.</a:t>
-            </a:r>
-          </a:p>
-          <a:p>
-            <a:pPr marL="0" marR="0" indent="0" algn="l" defTabSz="457200" rtl="0" eaLnBrk="1" fontAlgn="auto" latinLnBrk="0" hangingPunct="1">
-              <a:lnSpc>
-                <a:spcPct val="100000"/>
-              </a:lnSpc>
-              <a:spcBef>
-                <a:spcPts val="0"/>
-              </a:spcBef>
-              <a:spcAft>
-                <a:spcPts val="0"/>
-              </a:spcAft>
-              <a:buClrTx/>
-              <a:buSzTx/>
-              <a:buFont typeface="Arial"/>
-              <a:buChar char="•"/>
-              <a:tabLst/>
-              <a:defRPr/>
-            </a:pPr>
-            <a:r>
-              <a:rPr lang="en-US" dirty="0" smtClean="0"/>
-              <a:t>Eases the writing, deploying, and sharing of new tests or benchmarks</a:t>
-            </a:r>
-          </a:p>
-          <a:p>
-            <a:pPr>
-              <a:buFont typeface="Arial"/>
-              <a:buChar char="•"/>
-            </a:pPr>
-            <a:endParaRPr lang="en-US" b="1" u="sng" dirty="0" smtClean="0">
-              <a:latin typeface="Arial" pitchFamily="-65" charset="0"/>
-              <a:ea typeface="ＭＳ Ｐゴシック" pitchFamily="-65" charset="-128"/>
-              <a:cs typeface="ＭＳ Ｐゴシック" pitchFamily="-65" charset="-128"/>
-            </a:endParaRPr>
-          </a:p>
-          <a:p>
-            <a:pPr marL="0" marR="0" lvl="0" indent="0" algn="l" defTabSz="457200" rtl="0" eaLnBrk="1" fontAlgn="auto" latinLnBrk="0" hangingPunct="1">
-              <a:lnSpc>
-                <a:spcPct val="100000"/>
-              </a:lnSpc>
-              <a:spcBef>
-                <a:spcPts val="0"/>
-              </a:spcBef>
-              <a:spcAft>
-                <a:spcPts val="0"/>
-              </a:spcAft>
-              <a:buClrTx/>
-              <a:buSzTx/>
-              <a:buFont typeface="Arial"/>
-              <a:buNone/>
-              <a:tabLst/>
-              <a:defRPr/>
-            </a:pPr>
-            <a:endParaRPr lang="en-US" dirty="0" smtClean="0">
-              <a:latin typeface="Arial" pitchFamily="-65" charset="0"/>
-              <a:ea typeface="ＭＳ Ｐゴシック" pitchFamily="-65" charset="-128"/>
-              <a:cs typeface="ＭＳ Ｐゴシック" pitchFamily="-65" charset="-128"/>
-            </a:endParaRPr>
-          </a:p>
-          <a:p>
-            <a:pPr marL="0" marR="0" indent="0" algn="l" defTabSz="457200" rtl="0" eaLnBrk="1" fontAlgn="auto" latinLnBrk="0" hangingPunct="1">
-              <a:lnSpc>
-                <a:spcPct val="100000"/>
-              </a:lnSpc>
-              <a:spcBef>
-                <a:spcPts val="0"/>
-              </a:spcBef>
-              <a:spcAft>
-                <a:spcPts val="0"/>
-              </a:spcAft>
-              <a:buClrTx/>
-              <a:buSzTx/>
-              <a:buFontTx/>
-              <a:buChar char="-"/>
-              <a:tabLst/>
-              <a:defRPr/>
-            </a:pPr>
-            <a:endParaRPr lang="en-US" dirty="0" smtClean="0">
-              <a:latin typeface="Arial" pitchFamily="-65" charset="0"/>
-              <a:ea typeface="ＭＳ Ｐゴシック" pitchFamily="-65" charset="-128"/>
-            </a:endParaRPr>
-          </a:p>
-          <a:p>
-            <a:r>
-              <a:rPr lang="en-US" dirty="0" smtClean="0">
-                <a:latin typeface="Arial" pitchFamily="-65" charset="0"/>
-                <a:ea typeface="ＭＳ Ｐゴシック" pitchFamily="-65" charset="-128"/>
-                <a:cs typeface="ＭＳ Ｐゴシック" pitchFamily="-65" charset="-128"/>
-              </a:rPr>
-              <a:t>We designed Inca to implement this user-level Grid monitoring and In addition to the features presented in the previous slide, Inca…</a:t>
-            </a:r>
-          </a:p>
-          <a:p>
-            <a:pPr>
-              <a:buFontTx/>
-              <a:buChar char="•"/>
-            </a:pPr>
-            <a:r>
-              <a:rPr lang="en-US" dirty="0" smtClean="0">
-                <a:latin typeface="Arial" pitchFamily="-65" charset="0"/>
-                <a:ea typeface="ＭＳ Ｐゴシック" pitchFamily="-65" charset="-128"/>
-                <a:cs typeface="ＭＳ Ｐゴシック" pitchFamily="-65" charset="-128"/>
-              </a:rPr>
-              <a:t>Collects more than pass/fail data such as error messages, version information, and performance information.</a:t>
-            </a:r>
-          </a:p>
-          <a:p>
-            <a:pPr>
-              <a:buFontTx/>
-              <a:buChar char="•"/>
-            </a:pPr>
-            <a:r>
-              <a:rPr lang="en-US" dirty="0" smtClean="0">
-                <a:latin typeface="Arial" pitchFamily="-65" charset="0"/>
-                <a:ea typeface="ＭＳ Ｐゴシック" pitchFamily="-65" charset="-128"/>
-                <a:cs typeface="ＭＳ Ｐゴシック" pitchFamily="-65" charset="-128"/>
-              </a:rPr>
-              <a:t>Inca also captures the context of a monitoring result as it executes such as the script name, version, arguments, etc so that when Inca reports an error, there is enough information for a system admin to understand how the result was collected for so they can either debug the problem or inform us that the test is testing the wrong thing. It also reports the system usage so that the impact of the testing can be understood so that you can reduce the frequency of a test if it’s taking too much resources.  Mention in future work automatically tune frequency based on impact and past history</a:t>
-            </a:r>
-          </a:p>
-          <a:p>
-            <a:pPr>
-              <a:buFontTx/>
-              <a:buChar char="•"/>
-            </a:pPr>
-            <a:r>
-              <a:rPr lang="en-US" dirty="0" smtClean="0">
-                <a:latin typeface="Arial" pitchFamily="-65" charset="0"/>
-                <a:ea typeface="ＭＳ Ｐゴシック" pitchFamily="-65" charset="-128"/>
-                <a:cs typeface="ＭＳ Ｐゴシック" pitchFamily="-65" charset="-128"/>
-              </a:rPr>
-              <a:t>Inca also provides mechanisms to make it easy to write a new test or benchmark and propagate it out the monitored resources.  More later.</a:t>
-            </a:r>
-          </a:p>
-          <a:p>
-            <a:pPr>
-              <a:buFontTx/>
-              <a:buChar char="•"/>
-            </a:pPr>
-            <a:r>
-              <a:rPr lang="en-US" dirty="0" smtClean="0">
-                <a:latin typeface="Arial" pitchFamily="-65" charset="0"/>
-                <a:ea typeface="ＭＳ Ｐゴシック" pitchFamily="-65" charset="-128"/>
-                <a:cs typeface="ＭＳ Ｐゴシック" pitchFamily="-65" charset="-128"/>
-              </a:rPr>
-              <a:t>Finally, because we are testing Grid services, a valid GSI credential is needed to authenticate to services.  Inca provides facilities to securely download a short-term proxy for a particular test or benchmark and then cleans it off the system so as to a proxy is only on the machine for the time that it’s needed.  Finally, all components communicate using SSL.</a:t>
-            </a:r>
-          </a:p>
-          <a:p>
-            <a:pPr>
-              <a:buFontTx/>
-              <a:buChar char="•"/>
-            </a:pPr>
-            <a:r>
-              <a:rPr lang="en-US" dirty="0" smtClean="0">
-                <a:latin typeface="Arial" pitchFamily="-65" charset="0"/>
-                <a:ea typeface="ＭＳ Ｐゴシック" pitchFamily="-65" charset="-128"/>
-                <a:cs typeface="ＭＳ Ｐゴシック" pitchFamily="-65" charset="-128"/>
-              </a:rPr>
-              <a:t>The figure here shows the architecture of a typical Inca deployment.  The components inside the gray box indicate the core components of Inca.  So, the way it works is that an administrator for Inca would have a set of monitoring data they want to collect from resources.  The admin would use a GUI client called </a:t>
-            </a:r>
-            <a:r>
-              <a:rPr lang="en-US" dirty="0" err="1" smtClean="0">
-                <a:latin typeface="Arial" pitchFamily="-65" charset="0"/>
-                <a:ea typeface="ＭＳ Ｐゴシック" pitchFamily="-65" charset="-128"/>
-                <a:cs typeface="ＭＳ Ｐゴシック" pitchFamily="-65" charset="-128"/>
-              </a:rPr>
-              <a:t>Incat</a:t>
-            </a:r>
-            <a:r>
-              <a:rPr lang="en-US" dirty="0" smtClean="0">
-                <a:latin typeface="Arial" pitchFamily="-65" charset="0"/>
-                <a:ea typeface="ＭＳ Ｐゴシック" pitchFamily="-65" charset="-128"/>
-                <a:cs typeface="ＭＳ Ｐゴシック" pitchFamily="-65" charset="-128"/>
-              </a:rPr>
-              <a:t> to generate a configuration (stored in XML) for that monitoring data that contains the names of the tests they want to run, their parameters, execution frequency, and resources.  That configuration is then sent to the agent component which downloads the tests from a repository and stages and launches a client called the reporter manager on each monitored resource.  As each RM runs a test at its scheduled time, the data is stored in a component called the depot where it can be queried and displayed by a data consumer in a web page for example.  </a:t>
-            </a:r>
-          </a:p>
-          <a:p>
-            <a:pPr>
-              <a:buFontTx/>
-              <a:buChar char="•"/>
-            </a:pPr>
-            <a:r>
-              <a:rPr lang="en-US" dirty="0" smtClean="0">
-                <a:latin typeface="Arial" pitchFamily="-65" charset="0"/>
-                <a:ea typeface="ＭＳ Ｐゴシック" pitchFamily="-65" charset="-128"/>
-                <a:cs typeface="ＭＳ Ｐゴシック" pitchFamily="-65" charset="-128"/>
-              </a:rPr>
-              <a:t>Talk a bit more about each component using from the bottom-up.</a:t>
-            </a:r>
-          </a:p>
-          <a:p>
             <a:pPr eaLnBrk="1" hangingPunct="1"/>
             <a:endParaRPr lang="en-US" dirty="0" smtClean="0">
               <a:latin typeface="Arial" pitchFamily="-65" charset="0"/>
@@ -1903,51 +1082,11 @@
           <a:bodyPr/>
           <a:lstStyle/>
           <a:p>
-            <a:r>
-              <a:rPr lang="en-US" smtClean="0">
-                <a:latin typeface="Arial" pitchFamily="-65" charset="0"/>
-                <a:ea typeface="ＭＳ Ｐゴシック" pitchFamily="-65" charset="-128"/>
-                <a:cs typeface="ＭＳ Ｐゴシック" pitchFamily="-65" charset="-128"/>
-              </a:rPr>
-              <a:t>PingPong reports min, max, mean ??</a:t>
-            </a:r>
-          </a:p>
-          <a:p>
-            <a:r>
-              <a:rPr lang="en-US" smtClean="0">
-                <a:latin typeface="Arial" pitchFamily="-65" charset="0"/>
-                <a:ea typeface="ＭＳ Ｐゴシック" pitchFamily="-65" charset="-128"/>
-                <a:cs typeface="ＭＳ Ｐゴシック" pitchFamily="-65" charset="-128"/>
-              </a:rPr>
-              <a:t>Paratec reports wall time, %comm, MPI call statistics</a:t>
-            </a:r>
-          </a:p>
-          <a:p>
-            <a:r>
-              <a:rPr lang="en-US" smtClean="0">
-                <a:latin typeface="Arial" pitchFamily="-65" charset="0"/>
-                <a:ea typeface="ＭＳ Ｐゴシック" pitchFamily="-65" charset="-128"/>
-                <a:cs typeface="ＭＳ Ｐゴシック" pitchFamily="-65" charset="-128"/>
-              </a:rPr>
-              <a:t>Grayed out machines we got results from initially but then removed</a:t>
-            </a:r>
-          </a:p>
-          <a:p>
-            <a:endParaRPr lang="en-US" smtClean="0">
+            <a:endParaRPr lang="en-US" dirty="0" smtClean="0">
               <a:latin typeface="Arial" pitchFamily="-65" charset="0"/>
               <a:ea typeface="ＭＳ Ｐゴシック" pitchFamily="-65" charset="-128"/>
               <a:cs typeface="ＭＳ Ｐゴシック" pitchFamily="-65" charset="-128"/>
             </a:endParaRPr>
-          </a:p>
-          <a:p>
-            <a:r>
-              <a:rPr lang="en-US" smtClean="0">
-                <a:latin typeface="Arial" pitchFamily="-65" charset="0"/>
-                <a:ea typeface="ＭＳ Ｐゴシック" pitchFamily="-65" charset="-128"/>
-                <a:cs typeface="ＭＳ Ｐゴシック" pitchFamily="-65" charset="-128"/>
-              </a:rPr>
-              <a:t>Mostly focused on functionality of TeraGrid.  But Inca is capable of collecting a wide variety of data and most recently we have been collaborating with the Pmac group at SDSC to execute instrumented application to TG resources thru Inca.  These apps are instrumented with IPM, which provides performance data that Inca report. Before, we just have simple tests of the batch system to ensure jobs can be submitted.  But this actually allows us to collect more details user-level data by leveraging the information that IPM reports</a:t>
-            </a:r>
           </a:p>
         </p:txBody>
       </p:sp>
@@ -2069,37 +1208,7 @@
               <a:buFontTx/>
               <a:buChar char="•"/>
             </a:pPr>
-            <a:r>
-              <a:rPr lang="en-US"/>
-              <a:t>Collect Grid benchmark measurements using GrASP (Grid Assessment Probes) developed by Henri Casanova and Allan Snavely’s groups</a:t>
-            </a:r>
-          </a:p>
-          <a:p>
-            <a:pPr>
-              <a:buFontTx/>
-              <a:buChar char="•"/>
-            </a:pPr>
-            <a:endParaRPr lang="en-US"/>
-          </a:p>
-          <a:p>
-            <a:pPr>
-              <a:buFontTx/>
-              <a:buChar char="•"/>
-            </a:pPr>
-            <a:endParaRPr lang="en-US"/>
-          </a:p>
-          <a:p>
-            <a:r>
-              <a:rPr lang="en-US"/>
-              <a:t>Requested queue time is 1 hour, actual compute is less than a minute</a:t>
-            </a:r>
-          </a:p>
-          <a:p>
-            <a:pPr>
-              <a:buFontTx/>
-              <a:buChar char="•"/>
-            </a:pPr>
-            <a:endParaRPr lang="en-US"/>
+            <a:endParaRPr lang="en-US" dirty="0"/>
           </a:p>
         </p:txBody>
       </p:sp>
@@ -2215,115 +1324,6 @@
               <a:buFontTx/>
               <a:buChar char="•"/>
             </a:pPr>
-            <a:endParaRPr lang="en-US">
-              <a:latin typeface="Arial" pitchFamily="-65" charset="0"/>
-              <a:ea typeface="ＭＳ Ｐゴシック" pitchFamily="-65" charset="-128"/>
-              <a:cs typeface="ＭＳ Ｐゴシック" pitchFamily="-65" charset="-128"/>
-            </a:endParaRPr>
-          </a:p>
-        </p:txBody>
-      </p:sp>
-    </p:spTree>
-  </p:cSld>
-  <p:clrMapOvr>
-    <a:masterClrMapping/>
-  </p:clrMapOvr>
-</p:notes>
-</file>
-
-<file path=ppt/notesSlides/notesSlide9.xml><?xml version="1.0" encoding="utf-8"?>
-<p:notes xmlns:a="http://schemas.openxmlformats.org/drawingml/2006/main" xmlns:r="http://schemas.openxmlformats.org/officeDocument/2006/relationships" xmlns:mc="http://schemas.openxmlformats.org/markup-compatibility/2006" xmlns:mv="urn:schemas-microsoft-com:mac:vml" xmlns:p="http://schemas.openxmlformats.org/presentationml/2006/main" mc:Ignorable="mv" mc:PreserveAttributes="mv:*">
-  <p:cSld>
-    <p:spTree>
-      <p:nvGrpSpPr>
-        <p:cNvPr id="1" name=""/>
-        <p:cNvGrpSpPr/>
-        <p:nvPr/>
-      </p:nvGrpSpPr>
-      <p:grpSpPr>
-        <a:xfrm>
-          <a:off x="0" y="0"/>
-          <a:ext cx="0" cy="0"/>
-          <a:chOff x="0" y="0"/>
-          <a:chExt cx="0" cy="0"/>
-        </a:xfrm>
-      </p:grpSpPr>
-      <p:sp>
-        <p:nvSpPr>
-          <p:cNvPr id="28674" name="Rectangle 7"/>
-          <p:cNvSpPr>
-            <a:spLocks noGrp="1" noChangeArrowheads="1"/>
-          </p:cNvSpPr>
-          <p:nvPr>
-            <p:ph type="sldNum" sz="quarter" idx="5"/>
-          </p:nvPr>
-        </p:nvSpPr>
-        <p:spPr>
-          <a:noFill/>
-        </p:spPr>
-        <p:txBody>
-          <a:bodyPr/>
-          <a:lstStyle/>
-          <a:p>
-            <a:fld id="{B5490588-3AA2-734F-A448-3E4575B1B1ED}" type="slidenum">
-              <a:rPr lang="en-US">
-                <a:latin typeface="Arial" pitchFamily="-65" charset="0"/>
-                <a:ea typeface="ＭＳ Ｐゴシック" pitchFamily="-65" charset="-128"/>
-                <a:cs typeface="ＭＳ Ｐゴシック" pitchFamily="-65" charset="-128"/>
-              </a:rPr>
-              <a:pPr/>
-              <a:t>9</a:t>
-            </a:fld>
-            <a:endParaRPr lang="en-US">
-              <a:latin typeface="Arial" pitchFamily="-65" charset="0"/>
-              <a:ea typeface="ＭＳ Ｐゴシック" pitchFamily="-65" charset="-128"/>
-              <a:cs typeface="ＭＳ Ｐゴシック" pitchFamily="-65" charset="-128"/>
-            </a:endParaRPr>
-          </a:p>
-        </p:txBody>
-      </p:sp>
-      <p:sp>
-        <p:nvSpPr>
-          <p:cNvPr id="28675" name="Rectangle 2"/>
-          <p:cNvSpPr>
-            <a:spLocks noGrp="1" noRot="1" noChangeAspect="1" noChangeArrowheads="1"/>
-          </p:cNvSpPr>
-          <p:nvPr>
-            <p:ph type="sldImg"/>
-          </p:nvPr>
-        </p:nvSpPr>
-        <p:spPr>
-          <a:solidFill>
-            <a:srgbClr val="FFFFFF"/>
-          </a:solidFill>
-          <a:ln/>
-        </p:spPr>
-      </p:sp>
-      <p:sp>
-        <p:nvSpPr>
-          <p:cNvPr id="28676" name="Rectangle 3"/>
-          <p:cNvSpPr>
-            <a:spLocks noGrp="1" noChangeArrowheads="1"/>
-          </p:cNvSpPr>
-          <p:nvPr>
-            <p:ph type="body" idx="1"/>
-          </p:nvPr>
-        </p:nvSpPr>
-        <p:spPr>
-          <a:solidFill>
-            <a:srgbClr val="FFFFFF"/>
-          </a:solidFill>
-          <a:ln>
-            <a:solidFill>
-              <a:srgbClr val="000000"/>
-            </a:solidFill>
-          </a:ln>
-        </p:spPr>
-        <p:txBody>
-          <a:bodyPr/>
-          <a:lstStyle/>
-          <a:p>
-            <a:pPr eaLnBrk="1" hangingPunct="1"/>
             <a:endParaRPr lang="en-US">
               <a:latin typeface="Arial" pitchFamily="-65" charset="0"/>
               <a:ea typeface="ＭＳ Ｐゴシック" pitchFamily="-65" charset="-128"/>
@@ -10782,268 +9782,6 @@
           <a:prstGeom prst="rect">
             <a:avLst/>
           </a:prstGeom>
-        </p:spPr>
-      </p:pic>
-    </p:spTree>
-  </p:cSld>
-  <p:clrMapOvr>
-    <a:masterClrMapping/>
-  </p:clrMapOvr>
-  <p:timing>
-    <p:tnLst>
-      <p:par>
-        <p:cTn id="1" dur="indefinite" restart="never" nodeType="tmRoot"/>
-      </p:par>
-    </p:tnLst>
-  </p:timing>
-</p:sld>
-</file>
-
-<file path=ppt/slides/slide9.xml><?xml version="1.0" encoding="utf-8"?>
-<p:sld xmlns:a="http://schemas.openxmlformats.org/drawingml/2006/main" xmlns:r="http://schemas.openxmlformats.org/officeDocument/2006/relationships" xmlns:mc="http://schemas.openxmlformats.org/markup-compatibility/2006" xmlns:mv="urn:schemas-microsoft-com:mac:vml" xmlns:p="http://schemas.openxmlformats.org/presentationml/2006/main" mc:Ignorable="mv" mc:PreserveAttributes="mv:*">
-  <p:cSld>
-    <p:spTree>
-      <p:nvGrpSpPr>
-        <p:cNvPr id="1" name=""/>
-        <p:cNvGrpSpPr/>
-        <p:nvPr/>
-      </p:nvGrpSpPr>
-      <p:grpSpPr>
-        <a:xfrm>
-          <a:off x="0" y="0"/>
-          <a:ext cx="0" cy="0"/>
-          <a:chOff x="0" y="0"/>
-          <a:chExt cx="0" cy="0"/>
-        </a:xfrm>
-      </p:grpSpPr>
-      <p:sp>
-        <p:nvSpPr>
-          <p:cNvPr id="27650" name="Rectangle 12"/>
-          <p:cNvSpPr>
-            <a:spLocks noGrp="1" noChangeArrowheads="1"/>
-          </p:cNvSpPr>
-          <p:nvPr>
-            <p:ph type="body" sz="half" idx="2"/>
-          </p:nvPr>
-        </p:nvSpPr>
-        <p:spPr>
-          <a:xfrm>
-            <a:off x="4422775" y="1422400"/>
-            <a:ext cx="4267200" cy="4749800"/>
-          </a:xfrm>
-        </p:spPr>
-        <p:txBody>
-          <a:bodyPr/>
-          <a:lstStyle/>
-          <a:p>
-            <a:r>
-              <a:rPr lang="en-US" sz="2400" dirty="0">
-                <a:latin typeface="Arial" pitchFamily="-65" charset="0"/>
-                <a:ea typeface="ＭＳ Ｐゴシック" pitchFamily="-65" charset="-128"/>
-              </a:rPr>
-              <a:t>Supported by:</a:t>
-            </a:r>
-            <a:endParaRPr lang="en-US" sz="2400" dirty="0" smtClean="0">
-              <a:latin typeface="Arial" pitchFamily="-65" charset="0"/>
-              <a:ea typeface="ＭＳ Ｐゴシック" pitchFamily="-65" charset="-128"/>
-            </a:endParaRPr>
-          </a:p>
-          <a:p>
-            <a:endParaRPr lang="en-US" sz="2400" dirty="0" smtClean="0">
-              <a:latin typeface="Arial" pitchFamily="-65" charset="0"/>
-              <a:ea typeface="ＭＳ Ｐゴシック" pitchFamily="-65" charset="-128"/>
-              <a:hlinkClick r:id="rId3"/>
-            </a:endParaRPr>
-          </a:p>
-          <a:p>
-            <a:endParaRPr lang="en-US" sz="2400" dirty="0" smtClean="0">
-              <a:latin typeface="Arial" pitchFamily="-65" charset="0"/>
-              <a:ea typeface="ＭＳ Ｐゴシック" pitchFamily="-65" charset="-128"/>
-              <a:hlinkClick r:id="rId3"/>
-            </a:endParaRPr>
-          </a:p>
-          <a:p>
-            <a:endParaRPr lang="en-US" sz="2400" dirty="0" smtClean="0">
-              <a:latin typeface="Arial" pitchFamily="-65" charset="0"/>
-              <a:ea typeface="ＭＳ Ｐゴシック" pitchFamily="-65" charset="-128"/>
-              <a:hlinkClick r:id="rId3"/>
-            </a:endParaRPr>
-          </a:p>
-          <a:p>
-            <a:endParaRPr lang="en-US" sz="2400" dirty="0" smtClean="0">
-              <a:latin typeface="Arial" pitchFamily="-65" charset="0"/>
-              <a:ea typeface="ＭＳ Ｐゴシック" pitchFamily="-65" charset="-128"/>
-              <a:hlinkClick r:id="rId3"/>
-            </a:endParaRPr>
-          </a:p>
-          <a:p>
-            <a:endParaRPr lang="en-US" sz="2400" dirty="0" smtClean="0">
-              <a:latin typeface="Arial" pitchFamily="-65" charset="0"/>
-              <a:ea typeface="ＭＳ Ｐゴシック" pitchFamily="-65" charset="-128"/>
-              <a:hlinkClick r:id="rId3"/>
-            </a:endParaRPr>
-          </a:p>
-          <a:p>
-            <a:r>
-              <a:rPr lang="en-US" sz="2400" dirty="0" smtClean="0">
-                <a:latin typeface="Arial" pitchFamily="-65" charset="0"/>
-                <a:ea typeface="ＭＳ Ｐゴシック" pitchFamily="-65" charset="-128"/>
-                <a:hlinkClick r:id="rId3"/>
-              </a:rPr>
-              <a:t>http://inca.sdsc.edu</a:t>
-            </a:r>
-            <a:endParaRPr lang="en-US" sz="2400" dirty="0" smtClean="0">
-              <a:latin typeface="Arial" pitchFamily="-65" charset="0"/>
-              <a:ea typeface="ＭＳ Ｐゴシック" pitchFamily="-65" charset="-128"/>
-            </a:endParaRPr>
-          </a:p>
-          <a:p>
-            <a:endParaRPr lang="en-US" sz="2400" dirty="0" smtClean="0">
-              <a:latin typeface="Arial" pitchFamily="-65" charset="0"/>
-              <a:ea typeface="ＭＳ Ｐゴシック" pitchFamily="-65" charset="-128"/>
-            </a:endParaRPr>
-          </a:p>
-          <a:p>
-            <a:r>
-              <a:rPr lang="en-US" sz="2400" dirty="0" smtClean="0">
-                <a:latin typeface="Arial" pitchFamily="-65" charset="0"/>
-                <a:ea typeface="ＭＳ Ｐゴシック" pitchFamily="-65" charset="-128"/>
-                <a:hlinkClick r:id="rId4"/>
-              </a:rPr>
-              <a:t>http://inca.teragrid.org</a:t>
-            </a:r>
-            <a:endParaRPr lang="en-US" sz="2400" dirty="0" smtClean="0">
-              <a:latin typeface="Arial" pitchFamily="-65" charset="0"/>
-              <a:ea typeface="ＭＳ Ｐゴシック" pitchFamily="-65" charset="-128"/>
-            </a:endParaRPr>
-          </a:p>
-          <a:p>
-            <a:endParaRPr lang="en-US" sz="2400" dirty="0">
-              <a:latin typeface="Arial" pitchFamily="-65" charset="0"/>
-              <a:ea typeface="ＭＳ Ｐゴシック" pitchFamily="-65" charset="-128"/>
-            </a:endParaRPr>
-          </a:p>
-        </p:txBody>
-      </p:sp>
-      <p:sp>
-        <p:nvSpPr>
-          <p:cNvPr id="27651" name="Rectangle 2"/>
-          <p:cNvSpPr>
-            <a:spLocks noGrp="1" noChangeArrowheads="1"/>
-          </p:cNvSpPr>
-          <p:nvPr>
-            <p:ph type="title"/>
-          </p:nvPr>
-        </p:nvSpPr>
-        <p:spPr/>
-        <p:txBody>
-          <a:bodyPr/>
-          <a:lstStyle/>
-          <a:p>
-            <a:r>
-              <a:rPr lang="en-US">
-                <a:latin typeface="Arial" pitchFamily="-65" charset="0"/>
-                <a:ea typeface="ＭＳ Ｐゴシック" pitchFamily="-65" charset="-128"/>
-              </a:rPr>
-              <a:t>Inca Information</a:t>
-            </a:r>
-          </a:p>
-        </p:txBody>
-      </p:sp>
-      <p:pic>
-        <p:nvPicPr>
-          <p:cNvPr id="27653" name="Picture 5" descr="tglogo"/>
-          <p:cNvPicPr>
-            <a:picLocks noChangeAspect="1" noChangeArrowheads="1"/>
-          </p:cNvPicPr>
-          <p:nvPr/>
-        </p:nvPicPr>
-        <p:blipFill>
-          <a:blip r:embed="rId5"/>
-          <a:srcRect/>
-          <a:stretch>
-            <a:fillRect/>
-          </a:stretch>
-        </p:blipFill>
-        <p:spPr bwMode="auto">
-          <a:xfrm>
-            <a:off x="6945313" y="2209800"/>
-            <a:ext cx="1230312" cy="1447800"/>
-          </a:xfrm>
-          <a:prstGeom prst="rect">
-            <a:avLst/>
-          </a:prstGeom>
-          <a:noFill/>
-          <a:ln w="9525">
-            <a:noFill/>
-            <a:miter lim="800000"/>
-            <a:headEnd/>
-            <a:tailEnd/>
-          </a:ln>
-        </p:spPr>
-      </p:pic>
-      <p:pic>
-        <p:nvPicPr>
-          <p:cNvPr id="27654" name="Picture 16" descr="nsfe"/>
-          <p:cNvPicPr>
-            <a:picLocks noChangeAspect="1" noChangeArrowheads="1"/>
-          </p:cNvPicPr>
-          <p:nvPr/>
-        </p:nvPicPr>
-        <p:blipFill>
-          <a:blip r:embed="rId6"/>
-          <a:srcRect/>
-          <a:stretch>
-            <a:fillRect/>
-          </a:stretch>
-        </p:blipFill>
-        <p:spPr bwMode="auto">
-          <a:xfrm>
-            <a:off x="5105400" y="2209800"/>
-            <a:ext cx="1411288" cy="1385888"/>
-          </a:xfrm>
-          <a:prstGeom prst="rect">
-            <a:avLst/>
-          </a:prstGeom>
-          <a:noFill/>
-          <a:ln w="9525">
-            <a:noFill/>
-            <a:miter lim="800000"/>
-            <a:headEnd/>
-            <a:tailEnd/>
-          </a:ln>
-        </p:spPr>
-      </p:pic>
-      <p:pic>
-        <p:nvPicPr>
-          <p:cNvPr id="8" name="Picture 4" descr="450px-Sacsayhuaman_(pixinn"/>
-          <p:cNvPicPr>
-            <a:picLocks noChangeAspect="1" noChangeArrowheads="1"/>
-          </p:cNvPicPr>
-          <p:nvPr/>
-        </p:nvPicPr>
-        <p:blipFill>
-          <a:blip r:embed="rId7"/>
-          <a:srcRect/>
-          <a:stretch>
-            <a:fillRect/>
-          </a:stretch>
-        </p:blipFill>
-        <p:spPr bwMode="auto">
-          <a:xfrm>
-            <a:off x="661459" y="1347788"/>
-            <a:ext cx="3371850" cy="4495800"/>
-          </a:xfrm>
-          <a:prstGeom prst="rect">
-            <a:avLst/>
-          </a:prstGeom>
-          <a:noFill/>
-          <a:ln w="9525">
-            <a:noFill/>
-            <a:miter lim="800000"/>
-            <a:headEnd/>
-            <a:tailEnd/>
-          </a:ln>
         </p:spPr>
       </p:pic>
     </p:spTree>

</xml_diff>